<commit_message>
Fixed equation objects in Memory elements
</commit_message>
<xml_diff>
--- a/fanout/pictures/pdf/MemoryElement.pptx
+++ b/fanout/pictures/pdf/MemoryElement.pptx
@@ -7,7 +7,7 @@
   <p:sldIdLst>
     <p:sldId id="256" r:id="rId2"/>
   </p:sldIdLst>
-  <p:sldSz cx="12252325" cy="5486400"/>
+  <p:sldSz cx="12252325" cy="4846638"/>
   <p:notesSz cx="6858000" cy="9144000"/>
   <p:defaultTextStyle>
     <a:defPPr>
@@ -136,8 +136,8 @@
         </p:nvSpPr>
         <p:spPr>
           <a:xfrm>
-            <a:off x="1531541" y="897890"/>
-            <a:ext cx="9189244" cy="1910080"/>
+            <a:off x="1531541" y="793189"/>
+            <a:ext cx="9189244" cy="1687348"/>
           </a:xfrm>
         </p:spPr>
         <p:txBody>
@@ -168,8 +168,8 @@
         </p:nvSpPr>
         <p:spPr>
           <a:xfrm>
-            <a:off x="1531541" y="2881630"/>
-            <a:ext cx="9189244" cy="1324610"/>
+            <a:off x="1531541" y="2545607"/>
+            <a:ext cx="9189244" cy="1170149"/>
           </a:xfrm>
         </p:spPr>
         <p:txBody>
@@ -238,7 +238,7 @@
           <a:p>
             <a:fld id="{AECBC7CE-E8D1-4FB5-9F47-7CD8F8DF0A09}" type="datetimeFigureOut">
               <a:rPr lang="en-US" smtClean="0"/>
-              <a:t>12/30/2013</a:t>
+              <a:t>2/26/2015</a:t>
             </a:fld>
             <a:endParaRPr lang="en-US"/>
           </a:p>
@@ -408,7 +408,7 @@
           <a:p>
             <a:fld id="{AECBC7CE-E8D1-4FB5-9F47-7CD8F8DF0A09}" type="datetimeFigureOut">
               <a:rPr lang="en-US" smtClean="0"/>
-              <a:t>12/30/2013</a:t>
+              <a:t>2/26/2015</a:t>
             </a:fld>
             <a:endParaRPr lang="en-US"/>
           </a:p>
@@ -498,8 +498,8 @@
         </p:nvSpPr>
         <p:spPr>
           <a:xfrm>
-            <a:off x="8768070" y="292100"/>
-            <a:ext cx="2641908" cy="4649470"/>
+            <a:off x="8768070" y="258038"/>
+            <a:ext cx="2641908" cy="4107301"/>
           </a:xfrm>
         </p:spPr>
         <p:txBody>
@@ -526,8 +526,8 @@
         </p:nvSpPr>
         <p:spPr>
           <a:xfrm>
-            <a:off x="842347" y="292100"/>
-            <a:ext cx="7772569" cy="4649470"/>
+            <a:off x="842349" y="258038"/>
+            <a:ext cx="7772569" cy="4107301"/>
           </a:xfrm>
         </p:spPr>
         <p:txBody>
@@ -588,7 +588,7 @@
           <a:p>
             <a:fld id="{AECBC7CE-E8D1-4FB5-9F47-7CD8F8DF0A09}" type="datetimeFigureOut">
               <a:rPr lang="en-US" smtClean="0"/>
-              <a:t>12/30/2013</a:t>
+              <a:t>2/26/2015</a:t>
             </a:fld>
             <a:endParaRPr lang="en-US"/>
           </a:p>
@@ -758,7 +758,7 @@
           <a:p>
             <a:fld id="{AECBC7CE-E8D1-4FB5-9F47-7CD8F8DF0A09}" type="datetimeFigureOut">
               <a:rPr lang="en-US" smtClean="0"/>
-              <a:t>12/30/2013</a:t>
+              <a:t>2/26/2015</a:t>
             </a:fld>
             <a:endParaRPr lang="en-US"/>
           </a:p>
@@ -848,8 +848,8 @@
         </p:nvSpPr>
         <p:spPr>
           <a:xfrm>
-            <a:off x="835966" y="1367791"/>
-            <a:ext cx="10567630" cy="2282190"/>
+            <a:off x="835966" y="1208294"/>
+            <a:ext cx="10567630" cy="2016067"/>
           </a:xfrm>
         </p:spPr>
         <p:txBody>
@@ -880,8 +880,8 @@
         </p:nvSpPr>
         <p:spPr>
           <a:xfrm>
-            <a:off x="835966" y="3671571"/>
-            <a:ext cx="10567630" cy="1200150"/>
+            <a:off x="835966" y="3243434"/>
+            <a:ext cx="10567630" cy="1060203"/>
           </a:xfrm>
         </p:spPr>
         <p:txBody>
@@ -1004,7 +1004,7 @@
           <a:p>
             <a:fld id="{AECBC7CE-E8D1-4FB5-9F47-7CD8F8DF0A09}" type="datetimeFigureOut">
               <a:rPr lang="en-US" smtClean="0"/>
-              <a:t>12/30/2013</a:t>
+              <a:t>2/26/2015</a:t>
             </a:fld>
             <a:endParaRPr lang="en-US"/>
           </a:p>
@@ -1117,8 +1117,8 @@
         </p:nvSpPr>
         <p:spPr>
           <a:xfrm>
-            <a:off x="842347" y="1460500"/>
-            <a:ext cx="5207238" cy="3481070"/>
+            <a:off x="842347" y="1290194"/>
+            <a:ext cx="5207238" cy="3075147"/>
           </a:xfrm>
         </p:spPr>
         <p:txBody>
@@ -1174,8 +1174,8 @@
         </p:nvSpPr>
         <p:spPr>
           <a:xfrm>
-            <a:off x="6202740" y="1460500"/>
-            <a:ext cx="5207238" cy="3481070"/>
+            <a:off x="6202740" y="1290194"/>
+            <a:ext cx="5207238" cy="3075147"/>
           </a:xfrm>
         </p:spPr>
         <p:txBody>
@@ -1236,7 +1236,7 @@
           <a:p>
             <a:fld id="{AECBC7CE-E8D1-4FB5-9F47-7CD8F8DF0A09}" type="datetimeFigureOut">
               <a:rPr lang="en-US" smtClean="0"/>
-              <a:t>12/30/2013</a:t>
+              <a:t>2/26/2015</a:t>
             </a:fld>
             <a:endParaRPr lang="en-US"/>
           </a:p>
@@ -1326,8 +1326,8 @@
         </p:nvSpPr>
         <p:spPr>
           <a:xfrm>
-            <a:off x="843943" y="292101"/>
-            <a:ext cx="10567630" cy="1060450"/>
+            <a:off x="843943" y="258040"/>
+            <a:ext cx="10567630" cy="936792"/>
           </a:xfrm>
         </p:spPr>
         <p:txBody>
@@ -1354,8 +1354,8 @@
         </p:nvSpPr>
         <p:spPr>
           <a:xfrm>
-            <a:off x="843944" y="1344930"/>
-            <a:ext cx="5183307" cy="659130"/>
+            <a:off x="843944" y="1188100"/>
+            <a:ext cx="5183307" cy="582270"/>
           </a:xfrm>
         </p:spPr>
         <p:txBody>
@@ -1419,8 +1419,8 @@
         </p:nvSpPr>
         <p:spPr>
           <a:xfrm>
-            <a:off x="843944" y="2004060"/>
-            <a:ext cx="5183307" cy="2947670"/>
+            <a:off x="843944" y="1770370"/>
+            <a:ext cx="5183307" cy="2603946"/>
           </a:xfrm>
         </p:spPr>
         <p:txBody>
@@ -1476,8 +1476,8 @@
         </p:nvSpPr>
         <p:spPr>
           <a:xfrm>
-            <a:off x="6202740" y="1344930"/>
-            <a:ext cx="5208834" cy="659130"/>
+            <a:off x="6202740" y="1188100"/>
+            <a:ext cx="5208834" cy="582270"/>
           </a:xfrm>
         </p:spPr>
         <p:txBody>
@@ -1541,8 +1541,8 @@
         </p:nvSpPr>
         <p:spPr>
           <a:xfrm>
-            <a:off x="6202740" y="2004060"/>
-            <a:ext cx="5208834" cy="2947670"/>
+            <a:off x="6202740" y="1770370"/>
+            <a:ext cx="5208834" cy="2603946"/>
           </a:xfrm>
         </p:spPr>
         <p:txBody>
@@ -1603,7 +1603,7 @@
           <a:p>
             <a:fld id="{AECBC7CE-E8D1-4FB5-9F47-7CD8F8DF0A09}" type="datetimeFigureOut">
               <a:rPr lang="en-US" smtClean="0"/>
-              <a:t>12/30/2013</a:t>
+              <a:t>2/26/2015</a:t>
             </a:fld>
             <a:endParaRPr lang="en-US"/>
           </a:p>
@@ -1721,7 +1721,7 @@
           <a:p>
             <a:fld id="{AECBC7CE-E8D1-4FB5-9F47-7CD8F8DF0A09}" type="datetimeFigureOut">
               <a:rPr lang="en-US" smtClean="0"/>
-              <a:t>12/30/2013</a:t>
+              <a:t>2/26/2015</a:t>
             </a:fld>
             <a:endParaRPr lang="en-US"/>
           </a:p>
@@ -1816,7 +1816,7 @@
           <a:p>
             <a:fld id="{AECBC7CE-E8D1-4FB5-9F47-7CD8F8DF0A09}" type="datetimeFigureOut">
               <a:rPr lang="en-US" smtClean="0"/>
-              <a:t>12/30/2013</a:t>
+              <a:t>2/26/2015</a:t>
             </a:fld>
             <a:endParaRPr lang="en-US"/>
           </a:p>
@@ -1906,8 +1906,8 @@
         </p:nvSpPr>
         <p:spPr>
           <a:xfrm>
-            <a:off x="843944" y="365760"/>
-            <a:ext cx="3951693" cy="1280160"/>
+            <a:off x="843946" y="323109"/>
+            <a:ext cx="3951693" cy="1130882"/>
           </a:xfrm>
         </p:spPr>
         <p:txBody>
@@ -1938,8 +1938,8 @@
         </p:nvSpPr>
         <p:spPr>
           <a:xfrm>
-            <a:off x="5208834" y="789940"/>
-            <a:ext cx="6202740" cy="3898900"/>
+            <a:off x="5208834" y="697826"/>
+            <a:ext cx="6202740" cy="3444255"/>
           </a:xfrm>
         </p:spPr>
         <p:txBody>
@@ -2023,8 +2023,8 @@
         </p:nvSpPr>
         <p:spPr>
           <a:xfrm>
-            <a:off x="843944" y="1645920"/>
-            <a:ext cx="3951693" cy="3049270"/>
+            <a:off x="843946" y="1453992"/>
+            <a:ext cx="3951693" cy="2693698"/>
           </a:xfrm>
         </p:spPr>
         <p:txBody>
@@ -2093,7 +2093,7 @@
           <a:p>
             <a:fld id="{AECBC7CE-E8D1-4FB5-9F47-7CD8F8DF0A09}" type="datetimeFigureOut">
               <a:rPr lang="en-US" smtClean="0"/>
-              <a:t>12/30/2013</a:t>
+              <a:t>2/26/2015</a:t>
             </a:fld>
             <a:endParaRPr lang="en-US"/>
           </a:p>
@@ -2183,8 +2183,8 @@
         </p:nvSpPr>
         <p:spPr>
           <a:xfrm>
-            <a:off x="843944" y="365760"/>
-            <a:ext cx="3951693" cy="1280160"/>
+            <a:off x="843946" y="323109"/>
+            <a:ext cx="3951693" cy="1130882"/>
           </a:xfrm>
         </p:spPr>
         <p:txBody>
@@ -2215,8 +2215,8 @@
         </p:nvSpPr>
         <p:spPr>
           <a:xfrm>
-            <a:off x="5208834" y="789940"/>
-            <a:ext cx="6202740" cy="3898900"/>
+            <a:off x="5208834" y="697826"/>
+            <a:ext cx="6202740" cy="3444255"/>
           </a:xfrm>
         </p:spPr>
         <p:txBody>
@@ -2280,8 +2280,8 @@
         </p:nvSpPr>
         <p:spPr>
           <a:xfrm>
-            <a:off x="843944" y="1645920"/>
-            <a:ext cx="3951693" cy="3049270"/>
+            <a:off x="843946" y="1453992"/>
+            <a:ext cx="3951693" cy="2693698"/>
           </a:xfrm>
         </p:spPr>
         <p:txBody>
@@ -2350,7 +2350,7 @@
           <a:p>
             <a:fld id="{AECBC7CE-E8D1-4FB5-9F47-7CD8F8DF0A09}" type="datetimeFigureOut">
               <a:rPr lang="en-US" smtClean="0"/>
-              <a:t>12/30/2013</a:t>
+              <a:t>2/26/2015</a:t>
             </a:fld>
             <a:endParaRPr lang="en-US"/>
           </a:p>
@@ -2445,8 +2445,8 @@
         </p:nvSpPr>
         <p:spPr>
           <a:xfrm>
-            <a:off x="842348" y="292101"/>
-            <a:ext cx="10567630" cy="1060450"/>
+            <a:off x="842348" y="258040"/>
+            <a:ext cx="10567630" cy="936792"/>
           </a:xfrm>
           <a:prstGeom prst="rect">
             <a:avLst/>
@@ -2478,8 +2478,8 @@
         </p:nvSpPr>
         <p:spPr>
           <a:xfrm>
-            <a:off x="842348" y="1460500"/>
-            <a:ext cx="10567630" cy="3481070"/>
+            <a:off x="842348" y="1290194"/>
+            <a:ext cx="10567630" cy="3075147"/>
           </a:xfrm>
           <a:prstGeom prst="rect">
             <a:avLst/>
@@ -2540,8 +2540,8 @@
         </p:nvSpPr>
         <p:spPr>
           <a:xfrm>
-            <a:off x="842347" y="5085080"/>
-            <a:ext cx="2756773" cy="292100"/>
+            <a:off x="842349" y="4492116"/>
+            <a:ext cx="2756773" cy="258038"/>
           </a:xfrm>
           <a:prstGeom prst="rect">
             <a:avLst/>
@@ -2563,7 +2563,7 @@
           <a:p>
             <a:fld id="{AECBC7CE-E8D1-4FB5-9F47-7CD8F8DF0A09}" type="datetimeFigureOut">
               <a:rPr lang="en-US" smtClean="0"/>
-              <a:t>12/30/2013</a:t>
+              <a:t>2/26/2015</a:t>
             </a:fld>
             <a:endParaRPr lang="en-US"/>
           </a:p>
@@ -2581,8 +2581,8 @@
         </p:nvSpPr>
         <p:spPr>
           <a:xfrm>
-            <a:off x="4058583" y="5085080"/>
-            <a:ext cx="4135160" cy="292100"/>
+            <a:off x="4058583" y="4492116"/>
+            <a:ext cx="4135160" cy="258038"/>
           </a:xfrm>
           <a:prstGeom prst="rect">
             <a:avLst/>
@@ -2618,8 +2618,8 @@
         </p:nvSpPr>
         <p:spPr>
           <a:xfrm>
-            <a:off x="8653205" y="5085080"/>
-            <a:ext cx="2756773" cy="292100"/>
+            <a:off x="8653207" y="4492116"/>
+            <a:ext cx="2756773" cy="258038"/>
           </a:xfrm>
           <a:prstGeom prst="rect">
             <a:avLst/>
@@ -2968,16 +2968,378 @@
           <a:chExt cx="0" cy="0"/>
         </a:xfrm>
       </p:grpSpPr>
-      <p:sp>
-        <p:nvSpPr>
-          <p:cNvPr id="58" name="Rounded Rectangle 57"/>
+      <p:pic>
+        <p:nvPicPr>
+          <p:cNvPr id="112" name="Picture 111"/>
+          <p:cNvPicPr>
+            <a:picLocks noChangeAspect="1"/>
+          </p:cNvPicPr>
+          <p:nvPr/>
+        </p:nvPicPr>
+        <p:blipFill>
+          <a:blip r:embed="rId2">
+            <a:extLst>
+              <a:ext uri="{28A0092B-C50C-407E-A947-70E740481C1C}">
+                <a14:useLocalDpi xmlns:a14="http://schemas.microsoft.com/office/drawing/2010/main" val="0"/>
+              </a:ext>
+            </a:extLst>
+          </a:blip>
+          <a:stretch>
+            <a:fillRect/>
+          </a:stretch>
+        </p:blipFill>
+        <p:spPr>
+          <a:xfrm>
+            <a:off x="25400" y="3259296"/>
+            <a:ext cx="12192000" cy="994023"/>
+          </a:xfrm>
+          <a:prstGeom prst="rect">
+            <a:avLst/>
+          </a:prstGeom>
+        </p:spPr>
+      </p:pic>
+      <p:pic>
+        <p:nvPicPr>
+          <p:cNvPr id="113" name="Picture 112"/>
+          <p:cNvPicPr>
+            <a:picLocks noChangeAspect="1"/>
+          </p:cNvPicPr>
+          <p:nvPr/>
+        </p:nvPicPr>
+        <p:blipFill>
+          <a:blip r:embed="rId3">
+            <a:extLst>
+              <a:ext uri="{28A0092B-C50C-407E-A947-70E740481C1C}">
+                <a14:useLocalDpi xmlns:a14="http://schemas.microsoft.com/office/drawing/2010/main" val="0"/>
+              </a:ext>
+            </a:extLst>
+          </a:blip>
+          <a:stretch>
+            <a:fillRect/>
+          </a:stretch>
+        </p:blipFill>
+        <p:spPr>
+          <a:xfrm>
+            <a:off x="25400" y="764680"/>
+            <a:ext cx="12192000" cy="992922"/>
+          </a:xfrm>
+          <a:prstGeom prst="rect">
+            <a:avLst/>
+          </a:prstGeom>
+        </p:spPr>
+      </p:pic>
+      <p:pic>
+        <p:nvPicPr>
+          <p:cNvPr id="114" name="Picture 113"/>
+          <p:cNvPicPr>
+            <a:picLocks noChangeAspect="1"/>
+          </p:cNvPicPr>
+          <p:nvPr/>
+        </p:nvPicPr>
+        <p:blipFill>
+          <a:blip r:embed="rId4">
+            <a:extLst>
+              <a:ext uri="{28A0092B-C50C-407E-A947-70E740481C1C}">
+                <a14:useLocalDpi xmlns:a14="http://schemas.microsoft.com/office/drawing/2010/main" val="0"/>
+              </a:ext>
+            </a:extLst>
+          </a:blip>
+          <a:stretch>
+            <a:fillRect/>
+          </a:stretch>
+        </p:blipFill>
+        <p:spPr>
+          <a:xfrm>
+            <a:off x="25400" y="1983346"/>
+            <a:ext cx="12192000" cy="992922"/>
+          </a:xfrm>
+          <a:prstGeom prst="rect">
+            <a:avLst/>
+          </a:prstGeom>
+        </p:spPr>
+      </p:pic>
+      <p:sp>
+        <p:nvSpPr>
+          <p:cNvPr id="115" name="TextBox 114"/>
+          <p:cNvSpPr txBox="1"/>
+          <p:nvPr/>
+        </p:nvSpPr>
+        <p:spPr>
+          <a:xfrm rot="1943861">
+            <a:off x="-124215" y="606155"/>
+            <a:ext cx="1532238" cy="369332"/>
+          </a:xfrm>
+          <a:prstGeom prst="rect">
+            <a:avLst/>
+          </a:prstGeom>
+          <a:noFill/>
+        </p:spPr>
+        <p:txBody>
+          <a:bodyPr wrap="square" rtlCol="0">
+            <a:spAutoFit/>
+          </a:bodyPr>
+          <a:lstStyle/>
+          <a:p>
+            <a:r>
+              <a:rPr lang="en-US" dirty="0" smtClean="0"/>
+              <a:t>READ</a:t>
+            </a:r>
+            <a:endParaRPr lang="en-US" dirty="0"/>
+          </a:p>
+        </p:txBody>
+      </p:sp>
+      <p:sp>
+        <p:nvSpPr>
+          <p:cNvPr id="116" name="TextBox 115"/>
+          <p:cNvSpPr txBox="1"/>
+          <p:nvPr/>
+        </p:nvSpPr>
+        <p:spPr>
+          <a:xfrm rot="1943861">
+            <a:off x="2604714" y="710262"/>
+            <a:ext cx="1532238" cy="369332"/>
+          </a:xfrm>
+          <a:prstGeom prst="rect">
+            <a:avLst/>
+          </a:prstGeom>
+          <a:noFill/>
+        </p:spPr>
+        <p:txBody>
+          <a:bodyPr wrap="square" rtlCol="0">
+            <a:spAutoFit/>
+          </a:bodyPr>
+          <a:lstStyle/>
+          <a:p>
+            <a:r>
+              <a:rPr lang="en-US" dirty="0" smtClean="0"/>
+              <a:t>SET</a:t>
+            </a:r>
+            <a:endParaRPr lang="en-US" dirty="0"/>
+          </a:p>
+        </p:txBody>
+      </p:sp>
+      <p:sp>
+        <p:nvSpPr>
+          <p:cNvPr id="117" name="TextBox 116"/>
+          <p:cNvSpPr txBox="1"/>
+          <p:nvPr/>
+        </p:nvSpPr>
+        <p:spPr>
+          <a:xfrm rot="1943861">
+            <a:off x="5079313" y="580014"/>
+            <a:ext cx="1532238" cy="369332"/>
+          </a:xfrm>
+          <a:prstGeom prst="rect">
+            <a:avLst/>
+          </a:prstGeom>
+          <a:noFill/>
+        </p:spPr>
+        <p:txBody>
+          <a:bodyPr wrap="square" rtlCol="0">
+            <a:spAutoFit/>
+          </a:bodyPr>
+          <a:lstStyle/>
+          <a:p>
+            <a:r>
+              <a:rPr lang="en-US" dirty="0" smtClean="0"/>
+              <a:t>CLEAR</a:t>
+            </a:r>
+            <a:endParaRPr lang="en-US" dirty="0"/>
+          </a:p>
+        </p:txBody>
+      </p:sp>
+      <p:sp>
+        <p:nvSpPr>
+          <p:cNvPr id="118" name="TextBox 117"/>
+          <p:cNvSpPr txBox="1"/>
+          <p:nvPr/>
+        </p:nvSpPr>
+        <p:spPr>
+          <a:xfrm rot="1943861">
+            <a:off x="6171711" y="606154"/>
+            <a:ext cx="1532238" cy="369332"/>
+          </a:xfrm>
+          <a:prstGeom prst="rect">
+            <a:avLst/>
+          </a:prstGeom>
+          <a:noFill/>
+        </p:spPr>
+        <p:txBody>
+          <a:bodyPr wrap="square" rtlCol="0">
+            <a:spAutoFit/>
+          </a:bodyPr>
+          <a:lstStyle/>
+          <a:p>
+            <a:r>
+              <a:rPr lang="en-US" dirty="0" smtClean="0"/>
+              <a:t>READ</a:t>
+            </a:r>
+            <a:endParaRPr lang="en-US" dirty="0"/>
+          </a:p>
+        </p:txBody>
+      </p:sp>
+      <p:sp>
+        <p:nvSpPr>
+          <p:cNvPr id="119" name="TextBox 118"/>
+          <p:cNvSpPr txBox="1"/>
+          <p:nvPr/>
+        </p:nvSpPr>
+        <p:spPr>
+          <a:xfrm rot="1943861">
+            <a:off x="8924034" y="705588"/>
+            <a:ext cx="1532238" cy="369332"/>
+          </a:xfrm>
+          <a:prstGeom prst="rect">
+            <a:avLst/>
+          </a:prstGeom>
+          <a:noFill/>
+        </p:spPr>
+        <p:txBody>
+          <a:bodyPr wrap="square" rtlCol="0">
+            <a:spAutoFit/>
+          </a:bodyPr>
+          <a:lstStyle/>
+          <a:p>
+            <a:r>
+              <a:rPr lang="en-US" dirty="0" smtClean="0"/>
+              <a:t>SET</a:t>
+            </a:r>
+            <a:endParaRPr lang="en-US" dirty="0"/>
+          </a:p>
+        </p:txBody>
+      </p:sp>
+      <p:sp>
+        <p:nvSpPr>
+          <p:cNvPr id="120" name="TextBox 119"/>
+          <p:cNvSpPr txBox="1"/>
+          <p:nvPr/>
+        </p:nvSpPr>
+        <p:spPr>
+          <a:xfrm rot="1943861">
+            <a:off x="11398633" y="575340"/>
+            <a:ext cx="1532238" cy="369332"/>
+          </a:xfrm>
+          <a:prstGeom prst="rect">
+            <a:avLst/>
+          </a:prstGeom>
+          <a:noFill/>
+        </p:spPr>
+        <p:txBody>
+          <a:bodyPr wrap="square" rtlCol="0">
+            <a:spAutoFit/>
+          </a:bodyPr>
+          <a:lstStyle/>
+          <a:p>
+            <a:r>
+              <a:rPr lang="en-US" dirty="0" smtClean="0"/>
+              <a:t>CLEAR</a:t>
+            </a:r>
+            <a:endParaRPr lang="en-US" dirty="0"/>
+          </a:p>
+        </p:txBody>
+      </p:sp>
+      <p:sp>
+        <p:nvSpPr>
+          <p:cNvPr id="121" name="TextBox 120"/>
+          <p:cNvSpPr txBox="1"/>
+          <p:nvPr/>
+        </p:nvSpPr>
+        <p:spPr>
+          <a:xfrm>
+            <a:off x="25400" y="1683090"/>
+            <a:ext cx="1470454" cy="369332"/>
+          </a:xfrm>
+          <a:prstGeom prst="rect">
+            <a:avLst/>
+          </a:prstGeom>
+          <a:noFill/>
+        </p:spPr>
+        <p:txBody>
+          <a:bodyPr wrap="square" rtlCol="0">
+            <a:spAutoFit/>
+          </a:bodyPr>
+          <a:lstStyle/>
+          <a:p>
+            <a:r>
+              <a:rPr lang="en-US" dirty="0" smtClean="0">
+                <a:latin typeface="Book Antiqua" panose="02040602050305030304" pitchFamily="18" charset="0"/>
+              </a:rPr>
+              <a:t>&lt;</a:t>
+            </a:r>
+            <a:r>
+              <a:rPr lang="en-US" i="1" dirty="0" smtClean="0">
+                <a:latin typeface="Book Antiqua" panose="02040602050305030304" pitchFamily="18" charset="0"/>
+              </a:rPr>
+              <a:t>d</a:t>
+            </a:r>
+            <a:r>
+              <a:rPr lang="en-US" dirty="0" smtClean="0">
+                <a:latin typeface="Book Antiqua" panose="02040602050305030304" pitchFamily="18" charset="0"/>
+              </a:rPr>
+              <a:t>&gt;</a:t>
+            </a:r>
+            <a:endParaRPr lang="en-US" dirty="0">
+              <a:latin typeface="Book Antiqua" panose="02040602050305030304" pitchFamily="18" charset="0"/>
+            </a:endParaRPr>
+          </a:p>
+        </p:txBody>
+      </p:sp>
+      <p:sp>
+        <p:nvSpPr>
+          <p:cNvPr id="122" name="TextBox 121"/>
+          <p:cNvSpPr txBox="1"/>
+          <p:nvPr/>
+        </p:nvSpPr>
+        <p:spPr>
+          <a:xfrm>
+            <a:off x="16119" y="2928064"/>
+            <a:ext cx="1470454" cy="369332"/>
+          </a:xfrm>
+          <a:prstGeom prst="rect">
+            <a:avLst/>
+          </a:prstGeom>
+          <a:noFill/>
+        </p:spPr>
+        <p:txBody>
+          <a:bodyPr wrap="square" rtlCol="0">
+            <a:spAutoFit/>
+          </a:bodyPr>
+          <a:lstStyle/>
+          <a:p>
+            <a:r>
+              <a:rPr lang="en-US" dirty="0" smtClean="0">
+                <a:latin typeface="Book Antiqua" panose="02040602050305030304" pitchFamily="18" charset="0"/>
+              </a:rPr>
+              <a:t>&lt;</a:t>
+            </a:r>
+            <a:r>
+              <a:rPr lang="en-US" i="1" dirty="0" err="1" smtClean="0">
+                <a:latin typeface="Book Antiqua" panose="02040602050305030304" pitchFamily="18" charset="0"/>
+              </a:rPr>
+              <a:t>d,l</a:t>
+            </a:r>
+            <a:r>
+              <a:rPr lang="en-US" dirty="0" smtClean="0">
+                <a:latin typeface="Book Antiqua" panose="02040602050305030304" pitchFamily="18" charset="0"/>
+              </a:rPr>
+              <a:t>&gt;</a:t>
+            </a:r>
+            <a:endParaRPr lang="en-US" dirty="0">
+              <a:latin typeface="Book Antiqua" panose="02040602050305030304" pitchFamily="18" charset="0"/>
+            </a:endParaRPr>
+          </a:p>
+        </p:txBody>
+      </p:sp>
+      <p:sp>
+        <p:nvSpPr>
+          <p:cNvPr id="123" name="Rounded Rectangle 122"/>
           <p:cNvSpPr/>
           <p:nvPr/>
         </p:nvSpPr>
         <p:spPr>
           <a:xfrm>
-            <a:off x="6121401" y="19564"/>
-            <a:ext cx="6096000" cy="466324"/>
+            <a:off x="6121401" y="12686"/>
+            <a:ext cx="6096000" cy="279414"/>
           </a:xfrm>
           <a:prstGeom prst="roundRect">
             <a:avLst/>
@@ -3010,286 +3372,16 @@
           </a:p>
         </p:txBody>
       </p:sp>
-      <p:pic>
-        <p:nvPicPr>
-          <p:cNvPr id="59" name="Picture 58"/>
-          <p:cNvPicPr>
-            <a:picLocks noChangeAspect="1"/>
-          </p:cNvPicPr>
+      <p:sp>
+        <p:nvSpPr>
+          <p:cNvPr id="124" name="Rounded Rectangle 123"/>
+          <p:cNvSpPr/>
           <p:nvPr/>
-        </p:nvPicPr>
-        <p:blipFill>
-          <a:blip r:embed="rId2">
-            <a:extLst>
-              <a:ext uri="{28A0092B-C50C-407E-A947-70E740481C1C}">
-                <a14:useLocalDpi xmlns:a14="http://schemas.microsoft.com/office/drawing/2010/main" val="0"/>
-              </a:ext>
-            </a:extLst>
-          </a:blip>
-          <a:stretch>
-            <a:fillRect/>
-          </a:stretch>
-        </p:blipFill>
+        </p:nvSpPr>
         <p:spPr>
           <a:xfrm>
-            <a:off x="25400" y="3691096"/>
-            <a:ext cx="12192000" cy="994023"/>
-          </a:xfrm>
-          <a:prstGeom prst="rect">
-            <a:avLst/>
-          </a:prstGeom>
-        </p:spPr>
-      </p:pic>
-      <p:pic>
-        <p:nvPicPr>
-          <p:cNvPr id="60" name="Picture 59"/>
-          <p:cNvPicPr>
-            <a:picLocks noChangeAspect="1"/>
-          </p:cNvPicPr>
-          <p:nvPr/>
-        </p:nvPicPr>
-        <p:blipFill>
-          <a:blip r:embed="rId3">
-            <a:extLst>
-              <a:ext uri="{28A0092B-C50C-407E-A947-70E740481C1C}">
-                <a14:useLocalDpi xmlns:a14="http://schemas.microsoft.com/office/drawing/2010/main" val="0"/>
-              </a:ext>
-            </a:extLst>
-          </a:blip>
-          <a:stretch>
-            <a:fillRect/>
-          </a:stretch>
-        </p:blipFill>
-        <p:spPr>
-          <a:xfrm>
-            <a:off x="25400" y="917080"/>
-            <a:ext cx="12192000" cy="992922"/>
-          </a:xfrm>
-          <a:prstGeom prst="rect">
-            <a:avLst/>
-          </a:prstGeom>
-        </p:spPr>
-      </p:pic>
-      <p:pic>
-        <p:nvPicPr>
-          <p:cNvPr id="61" name="Picture 60"/>
-          <p:cNvPicPr>
-            <a:picLocks noChangeAspect="1"/>
-          </p:cNvPicPr>
-          <p:nvPr/>
-        </p:nvPicPr>
-        <p:blipFill>
-          <a:blip r:embed="rId4">
-            <a:extLst>
-              <a:ext uri="{28A0092B-C50C-407E-A947-70E740481C1C}">
-                <a14:useLocalDpi xmlns:a14="http://schemas.microsoft.com/office/drawing/2010/main" val="0"/>
-              </a:ext>
-            </a:extLst>
-          </a:blip>
-          <a:stretch>
-            <a:fillRect/>
-          </a:stretch>
-        </p:blipFill>
-        <p:spPr>
-          <a:xfrm>
-            <a:off x="25400" y="2262746"/>
-            <a:ext cx="12192000" cy="992922"/>
-          </a:xfrm>
-          <a:prstGeom prst="rect">
-            <a:avLst/>
-          </a:prstGeom>
-        </p:spPr>
-      </p:pic>
-      <p:sp>
-        <p:nvSpPr>
-          <p:cNvPr id="62" name="TextBox 61"/>
-          <p:cNvSpPr txBox="1"/>
-          <p:nvPr/>
-        </p:nvSpPr>
-        <p:spPr>
-          <a:xfrm rot="1943861">
-            <a:off x="-124215" y="758555"/>
-            <a:ext cx="1532238" cy="369332"/>
-          </a:xfrm>
-          <a:prstGeom prst="rect">
-            <a:avLst/>
-          </a:prstGeom>
-          <a:noFill/>
-        </p:spPr>
-        <p:txBody>
-          <a:bodyPr wrap="square" rtlCol="0">
-            <a:spAutoFit/>
-          </a:bodyPr>
-          <a:lstStyle/>
-          <a:p>
-            <a:r>
-              <a:rPr lang="en-US" dirty="0" smtClean="0"/>
-              <a:t>READ</a:t>
-            </a:r>
-            <a:endParaRPr lang="en-US" dirty="0"/>
-          </a:p>
-        </p:txBody>
-      </p:sp>
-      <p:sp>
-        <p:nvSpPr>
-          <p:cNvPr id="63" name="TextBox 62"/>
-          <p:cNvSpPr txBox="1"/>
-          <p:nvPr/>
-        </p:nvSpPr>
-        <p:spPr>
-          <a:xfrm rot="1943861">
-            <a:off x="2604714" y="862662"/>
-            <a:ext cx="1532238" cy="369332"/>
-          </a:xfrm>
-          <a:prstGeom prst="rect">
-            <a:avLst/>
-          </a:prstGeom>
-          <a:noFill/>
-        </p:spPr>
-        <p:txBody>
-          <a:bodyPr wrap="square" rtlCol="0">
-            <a:spAutoFit/>
-          </a:bodyPr>
-          <a:lstStyle/>
-          <a:p>
-            <a:r>
-              <a:rPr lang="en-US" dirty="0" smtClean="0"/>
-              <a:t>SET</a:t>
-            </a:r>
-            <a:endParaRPr lang="en-US" dirty="0"/>
-          </a:p>
-        </p:txBody>
-      </p:sp>
-      <p:sp>
-        <p:nvSpPr>
-          <p:cNvPr id="64" name="TextBox 63"/>
-          <p:cNvSpPr txBox="1"/>
-          <p:nvPr/>
-        </p:nvSpPr>
-        <p:spPr>
-          <a:xfrm rot="1943861">
-            <a:off x="5079313" y="732414"/>
-            <a:ext cx="1532238" cy="369332"/>
-          </a:xfrm>
-          <a:prstGeom prst="rect">
-            <a:avLst/>
-          </a:prstGeom>
-          <a:noFill/>
-        </p:spPr>
-        <p:txBody>
-          <a:bodyPr wrap="square" rtlCol="0">
-            <a:spAutoFit/>
-          </a:bodyPr>
-          <a:lstStyle/>
-          <a:p>
-            <a:r>
-              <a:rPr lang="en-US" dirty="0" smtClean="0"/>
-              <a:t>CLEAR</a:t>
-            </a:r>
-            <a:endParaRPr lang="en-US" dirty="0"/>
-          </a:p>
-        </p:txBody>
-      </p:sp>
-      <p:sp>
-        <p:nvSpPr>
-          <p:cNvPr id="65" name="TextBox 64"/>
-          <p:cNvSpPr txBox="1"/>
-          <p:nvPr/>
-        </p:nvSpPr>
-        <p:spPr>
-          <a:xfrm rot="1943861">
-            <a:off x="6171711" y="758554"/>
-            <a:ext cx="1532238" cy="369332"/>
-          </a:xfrm>
-          <a:prstGeom prst="rect">
-            <a:avLst/>
-          </a:prstGeom>
-          <a:noFill/>
-        </p:spPr>
-        <p:txBody>
-          <a:bodyPr wrap="square" rtlCol="0">
-            <a:spAutoFit/>
-          </a:bodyPr>
-          <a:lstStyle/>
-          <a:p>
-            <a:r>
-              <a:rPr lang="en-US" dirty="0" smtClean="0"/>
-              <a:t>READ</a:t>
-            </a:r>
-            <a:endParaRPr lang="en-US" dirty="0"/>
-          </a:p>
-        </p:txBody>
-      </p:sp>
-      <p:sp>
-        <p:nvSpPr>
-          <p:cNvPr id="66" name="TextBox 65"/>
-          <p:cNvSpPr txBox="1"/>
-          <p:nvPr/>
-        </p:nvSpPr>
-        <p:spPr>
-          <a:xfrm rot="1943861">
-            <a:off x="8924034" y="857988"/>
-            <a:ext cx="1532238" cy="369332"/>
-          </a:xfrm>
-          <a:prstGeom prst="rect">
-            <a:avLst/>
-          </a:prstGeom>
-          <a:noFill/>
-        </p:spPr>
-        <p:txBody>
-          <a:bodyPr wrap="square" rtlCol="0">
-            <a:spAutoFit/>
-          </a:bodyPr>
-          <a:lstStyle/>
-          <a:p>
-            <a:r>
-              <a:rPr lang="en-US" dirty="0" smtClean="0"/>
-              <a:t>SET</a:t>
-            </a:r>
-            <a:endParaRPr lang="en-US" dirty="0"/>
-          </a:p>
-        </p:txBody>
-      </p:sp>
-      <p:sp>
-        <p:nvSpPr>
-          <p:cNvPr id="67" name="TextBox 66"/>
-          <p:cNvSpPr txBox="1"/>
-          <p:nvPr/>
-        </p:nvSpPr>
-        <p:spPr>
-          <a:xfrm rot="1943861">
-            <a:off x="11398633" y="727740"/>
-            <a:ext cx="1532238" cy="369332"/>
-          </a:xfrm>
-          <a:prstGeom prst="rect">
-            <a:avLst/>
-          </a:prstGeom>
-          <a:noFill/>
-        </p:spPr>
-        <p:txBody>
-          <a:bodyPr wrap="square" rtlCol="0">
-            <a:spAutoFit/>
-          </a:bodyPr>
-          <a:lstStyle/>
-          <a:p>
-            <a:r>
-              <a:rPr lang="en-US" dirty="0" smtClean="0"/>
-              <a:t>CLEAR</a:t>
-            </a:r>
-            <a:endParaRPr lang="en-US" dirty="0"/>
-          </a:p>
-        </p:txBody>
-      </p:sp>
-      <p:sp>
-        <p:nvSpPr>
-          <p:cNvPr id="68" name="Rounded Rectangle 67"/>
-          <p:cNvSpPr/>
-          <p:nvPr/>
-        </p:nvSpPr>
-        <p:spPr>
-          <a:xfrm>
-            <a:off x="25400" y="9926"/>
-            <a:ext cx="6096000" cy="466324"/>
+            <a:off x="25400" y="12686"/>
+            <a:ext cx="6096000" cy="271339"/>
           </a:xfrm>
           <a:prstGeom prst="roundRect">
             <a:avLst/>
@@ -3324,13 +3416,13 @@
       </p:sp>
       <p:sp>
         <p:nvSpPr>
-          <p:cNvPr id="69" name="TextBox 68"/>
+          <p:cNvPr id="125" name="TextBox 124"/>
           <p:cNvSpPr txBox="1"/>
           <p:nvPr/>
         </p:nvSpPr>
         <p:spPr>
           <a:xfrm>
-            <a:off x="25400" y="1924390"/>
+            <a:off x="18276" y="4228483"/>
             <a:ext cx="1470454" cy="369332"/>
           </a:xfrm>
           <a:prstGeom prst="rect">
@@ -3345,98 +3437,6 @@
           <a:lstStyle/>
           <a:p>
             <a:r>
-              <a:rPr lang="en-US" dirty="0" smtClean="0">
-                <a:latin typeface="Book Antiqua" panose="02040602050305030304" pitchFamily="18" charset="0"/>
-              </a:rPr>
-              <a:t>&lt;</a:t>
-            </a:r>
-            <a:r>
-              <a:rPr lang="en-US" i="1" dirty="0" smtClean="0">
-                <a:latin typeface="Book Antiqua" panose="02040602050305030304" pitchFamily="18" charset="0"/>
-              </a:rPr>
-              <a:t>d</a:t>
-            </a:r>
-            <a:r>
-              <a:rPr lang="en-US" dirty="0" smtClean="0">
-                <a:latin typeface="Book Antiqua" panose="02040602050305030304" pitchFamily="18" charset="0"/>
-              </a:rPr>
-              <a:t>&gt;</a:t>
-            </a:r>
-            <a:endParaRPr lang="en-US" dirty="0">
-              <a:latin typeface="Book Antiqua" panose="02040602050305030304" pitchFamily="18" charset="0"/>
-            </a:endParaRPr>
-          </a:p>
-        </p:txBody>
-      </p:sp>
-      <p:sp>
-        <p:nvSpPr>
-          <p:cNvPr id="70" name="TextBox 69"/>
-          <p:cNvSpPr txBox="1"/>
-          <p:nvPr/>
-        </p:nvSpPr>
-        <p:spPr>
-          <a:xfrm>
-            <a:off x="16119" y="3321764"/>
-            <a:ext cx="1470454" cy="369332"/>
-          </a:xfrm>
-          <a:prstGeom prst="rect">
-            <a:avLst/>
-          </a:prstGeom>
-          <a:noFill/>
-        </p:spPr>
-        <p:txBody>
-          <a:bodyPr wrap="square" rtlCol="0">
-            <a:spAutoFit/>
-          </a:bodyPr>
-          <a:lstStyle/>
-          <a:p>
-            <a:r>
-              <a:rPr lang="en-US" dirty="0" smtClean="0">
-                <a:latin typeface="Book Antiqua" panose="02040602050305030304" pitchFamily="18" charset="0"/>
-              </a:rPr>
-              <a:t>&lt;</a:t>
-            </a:r>
-            <a:r>
-              <a:rPr lang="en-US" i="1" dirty="0" err="1" smtClean="0">
-                <a:latin typeface="Book Antiqua" panose="02040602050305030304" pitchFamily="18" charset="0"/>
-              </a:rPr>
-              <a:t>d,l</a:t>
-            </a:r>
-            <a:r>
-              <a:rPr lang="en-US" dirty="0" smtClean="0">
-                <a:latin typeface="Book Antiqua" panose="02040602050305030304" pitchFamily="18" charset="0"/>
-              </a:rPr>
-              <a:t>&gt;</a:t>
-            </a:r>
-            <a:endParaRPr lang="en-US" dirty="0">
-              <a:latin typeface="Book Antiqua" panose="02040602050305030304" pitchFamily="18" charset="0"/>
-            </a:endParaRPr>
-          </a:p>
-        </p:txBody>
-      </p:sp>
-      <p:sp>
-        <p:nvSpPr>
-          <p:cNvPr id="71" name="TextBox 70"/>
-          <p:cNvSpPr txBox="1"/>
-          <p:nvPr/>
-        </p:nvSpPr>
-        <p:spPr>
-          <a:xfrm>
-            <a:off x="16119" y="4646722"/>
-            <a:ext cx="1470454" cy="369332"/>
-          </a:xfrm>
-          <a:prstGeom prst="rect">
-            <a:avLst/>
-          </a:prstGeom>
-          <a:noFill/>
-        </p:spPr>
-        <p:txBody>
-          <a:bodyPr wrap="square" rtlCol="0">
-            <a:spAutoFit/>
-          </a:bodyPr>
-          <a:lstStyle/>
-          <a:p>
-            <a:r>
               <a:rPr lang="en-US" dirty="0" smtClean="0"/>
               <a:t>&lt;</a:t>
             </a:r>
@@ -3456,14 +3456,14 @@
       </p:sp>
       <p:sp>
         <p:nvSpPr>
-          <p:cNvPr id="72" name="Rounded Rectangle 71"/>
+          <p:cNvPr id="126" name="Rounded Rectangle 125"/>
           <p:cNvSpPr/>
           <p:nvPr/>
         </p:nvSpPr>
         <p:spPr>
           <a:xfrm>
-            <a:off x="2126050" y="4992563"/>
-            <a:ext cx="1729946" cy="466324"/>
+            <a:off x="2128207" y="4546048"/>
+            <a:ext cx="1729946" cy="264973"/>
           </a:xfrm>
           <a:prstGeom prst="roundRect">
             <a:avLst/>
@@ -3498,14 +3498,14 @@
       </p:sp>
       <p:sp>
         <p:nvSpPr>
-          <p:cNvPr id="73" name="Rounded Rectangle 72"/>
+          <p:cNvPr id="127" name="Rounded Rectangle 126"/>
           <p:cNvSpPr/>
           <p:nvPr/>
         </p:nvSpPr>
         <p:spPr>
           <a:xfrm>
-            <a:off x="6282039" y="4992563"/>
-            <a:ext cx="1729946" cy="466324"/>
+            <a:off x="6284196" y="4546048"/>
+            <a:ext cx="1729946" cy="264973"/>
           </a:xfrm>
           <a:prstGeom prst="roundRect">
             <a:avLst/>
@@ -3540,14 +3540,14 @@
       </p:sp>
       <p:sp>
         <p:nvSpPr>
-          <p:cNvPr id="74" name="Rounded Rectangle 73"/>
+          <p:cNvPr id="128" name="Rounded Rectangle 127"/>
           <p:cNvSpPr/>
           <p:nvPr/>
         </p:nvSpPr>
         <p:spPr>
           <a:xfrm>
-            <a:off x="8395044" y="4992563"/>
-            <a:ext cx="1729946" cy="466324"/>
+            <a:off x="8397201" y="4546048"/>
+            <a:ext cx="1729946" cy="264973"/>
           </a:xfrm>
           <a:prstGeom prst="roundRect">
             <a:avLst/>
@@ -3582,14 +3582,14 @@
       </p:sp>
       <p:sp>
         <p:nvSpPr>
-          <p:cNvPr id="75" name="Rounded Rectangle 74"/>
+          <p:cNvPr id="129" name="Rounded Rectangle 128"/>
           <p:cNvSpPr/>
           <p:nvPr/>
         </p:nvSpPr>
         <p:spPr>
           <a:xfrm>
-            <a:off x="4204044" y="4992563"/>
-            <a:ext cx="1729946" cy="466324"/>
+            <a:off x="4206201" y="4546048"/>
+            <a:ext cx="1729946" cy="264973"/>
           </a:xfrm>
           <a:prstGeom prst="roundRect">
             <a:avLst/>
@@ -3624,14 +3624,14 @@
       </p:sp>
       <p:sp>
         <p:nvSpPr>
-          <p:cNvPr id="76" name="Rounded Rectangle 75"/>
+          <p:cNvPr id="130" name="Rounded Rectangle 129"/>
           <p:cNvSpPr/>
           <p:nvPr/>
         </p:nvSpPr>
         <p:spPr>
           <a:xfrm>
-            <a:off x="13045" y="5002561"/>
-            <a:ext cx="1729946" cy="466324"/>
+            <a:off x="15202" y="4556046"/>
+            <a:ext cx="1729946" cy="254975"/>
           </a:xfrm>
           <a:prstGeom prst="roundRect">
             <a:avLst/>
@@ -3666,14 +3666,14 @@
       </p:sp>
       <p:sp>
         <p:nvSpPr>
-          <p:cNvPr id="77" name="Rounded Rectangle 76"/>
+          <p:cNvPr id="131" name="Rounded Rectangle 130"/>
           <p:cNvSpPr/>
           <p:nvPr/>
         </p:nvSpPr>
         <p:spPr>
           <a:xfrm>
-            <a:off x="10435968" y="5002561"/>
-            <a:ext cx="1729946" cy="466324"/>
+            <a:off x="10438125" y="4556046"/>
+            <a:ext cx="1729946" cy="264973"/>
           </a:xfrm>
           <a:prstGeom prst="roundRect">
             <a:avLst/>
@@ -3710,13 +3710,13 @@
         <mc:Choice xmlns:a14="http://schemas.microsoft.com/office/drawing/2010/main" Requires="a14">
           <p:sp>
             <p:nvSpPr>
-              <p:cNvPr id="78" name="Rectangle 77"/>
+              <p:cNvPr id="132" name="Rectangle 131"/>
               <p:cNvSpPr/>
               <p:nvPr/>
             </p:nvSpPr>
             <p:spPr>
               <a:xfrm>
-                <a:off x="1179940" y="4632652"/>
+                <a:off x="1182097" y="4228483"/>
                 <a:ext cx="520784" cy="369909"/>
               </a:xfrm>
               <a:prstGeom prst="rect">
@@ -3729,6 +3729,7 @@
               </a:bodyPr>
               <a:lstStyle/>
               <a:p>
+                <a:pPr/>
                 <a14:m>
                   <m:oMathPara xmlns:m="http://schemas.openxmlformats.org/officeDocument/2006/math">
                     <m:oMathParaPr>
@@ -3739,7 +3740,7 @@
                         <m:sSubPr>
                           <m:ctrlPr>
                             <a:rPr lang="en-US" i="1" dirty="0" smtClean="0">
-                              <a:latin typeface="Cambria Math" panose="02040503050406030204" pitchFamily="18" charset="0"/>
+                              <a:latin typeface="Cambria Math"/>
                             </a:rPr>
                           </m:ctrlPr>
                         </m:sSubPr>
@@ -3749,7 +3750,7 @@
                               <m:chr m:val="̅"/>
                               <m:ctrlPr>
                                 <a:rPr lang="en-US" i="1" dirty="0" smtClean="0">
-                                  <a:latin typeface="Cambria Math" panose="02040503050406030204" pitchFamily="18" charset="0"/>
+                                  <a:latin typeface="Cambria Math"/>
                                 </a:rPr>
                               </m:ctrlPr>
                             </m:accPr>
@@ -3786,7 +3787,7 @@
         <mc:Fallback>
           <p:sp>
             <p:nvSpPr>
-              <p:cNvPr id="78" name="Rectangle 77"/>
+              <p:cNvPr id="132" name="Rectangle 131"/>
               <p:cNvSpPr>
                 <a:spLocks noRot="1" noChangeAspect="1" noMove="1" noResize="1" noEditPoints="1" noAdjustHandles="1" noChangeArrowheads="1" noChangeShapeType="1" noTextEdit="1"/>
               </p:cNvSpPr>
@@ -3794,16 +3795,16 @@
             </p:nvSpPr>
             <p:spPr>
               <a:xfrm>
-                <a:off x="1179940" y="4632652"/>
+                <a:off x="1182097" y="4228483"/>
                 <a:ext cx="520784" cy="369909"/>
               </a:xfrm>
               <a:prstGeom prst="rect">
                 <a:avLst/>
               </a:prstGeom>
-              <a:blipFill rotWithShape="0">
+              <a:blipFill rotWithShape="1">
                 <a:blip r:embed="rId5"/>
                 <a:stretch>
-                  <a:fillRect b="-9836"/>
+                  <a:fillRect b="-11667"/>
                 </a:stretch>
               </a:blipFill>
             </p:spPr>
@@ -3826,13 +3827,13 @@
         <mc:Choice xmlns:a14="http://schemas.microsoft.com/office/drawing/2010/main" Requires="a14">
           <p:sp>
             <p:nvSpPr>
-              <p:cNvPr id="79" name="Rectangle 78"/>
+              <p:cNvPr id="133" name="Rectangle 132"/>
               <p:cNvSpPr/>
               <p:nvPr/>
             </p:nvSpPr>
             <p:spPr>
               <a:xfrm>
-                <a:off x="5087854" y="4646722"/>
+                <a:off x="5090011" y="4228483"/>
                 <a:ext cx="589136" cy="369332"/>
               </a:xfrm>
               <a:prstGeom prst="rect">
@@ -3845,6 +3846,7 @@
               </a:bodyPr>
               <a:lstStyle/>
               <a:p>
+                <a:pPr/>
                 <a14:m>
                   <m:oMathPara xmlns:m="http://schemas.openxmlformats.org/officeDocument/2006/math">
                     <m:oMathParaPr>
@@ -3855,7 +3857,7 @@
                         <m:sSubPr>
                           <m:ctrlPr>
                             <a:rPr lang="en-US" b="0" i="1" dirty="0" smtClean="0">
-                              <a:latin typeface="Cambria Math" panose="02040503050406030204" pitchFamily="18" charset="0"/>
+                              <a:latin typeface="Cambria Math"/>
                             </a:rPr>
                           </m:ctrlPr>
                         </m:sSubPr>
@@ -3896,7 +3898,7 @@
         <mc:Fallback>
           <p:sp>
             <p:nvSpPr>
-              <p:cNvPr id="79" name="Rectangle 78"/>
+              <p:cNvPr id="133" name="Rectangle 132"/>
               <p:cNvSpPr>
                 <a:spLocks noRot="1" noChangeAspect="1" noMove="1" noResize="1" noEditPoints="1" noAdjustHandles="1" noChangeArrowheads="1" noChangeShapeType="1" noTextEdit="1"/>
               </p:cNvSpPr>
@@ -3904,13 +3906,13 @@
             </p:nvSpPr>
             <p:spPr>
               <a:xfrm>
-                <a:off x="5087854" y="4646722"/>
+                <a:off x="5090011" y="4228483"/>
                 <a:ext cx="589136" cy="369332"/>
               </a:xfrm>
               <a:prstGeom prst="rect">
                 <a:avLst/>
               </a:prstGeom>
-              <a:blipFill rotWithShape="0">
+              <a:blipFill rotWithShape="1">
                 <a:blip r:embed="rId6"/>
                 <a:stretch>
                   <a:fillRect/>
@@ -3936,13 +3938,13 @@
         <mc:Choice xmlns:a14="http://schemas.microsoft.com/office/drawing/2010/main" Requires="a14">
           <p:sp>
             <p:nvSpPr>
-              <p:cNvPr id="80" name="Rectangle 79"/>
+              <p:cNvPr id="134" name="Rectangle 133"/>
               <p:cNvSpPr/>
               <p:nvPr/>
             </p:nvSpPr>
             <p:spPr>
               <a:xfrm>
-                <a:off x="6625655" y="4646722"/>
+                <a:off x="6627812" y="4228483"/>
                 <a:ext cx="572080" cy="369332"/>
               </a:xfrm>
               <a:prstGeom prst="rect">
@@ -3966,7 +3968,7 @@
                         <m:sSubPr>
                           <m:ctrlPr>
                             <a:rPr lang="en-US" i="1" dirty="0" smtClean="0">
-                              <a:latin typeface="Cambria Math" panose="02040503050406030204" pitchFamily="18" charset="0"/>
+                              <a:latin typeface="Cambria Math"/>
                             </a:rPr>
                           </m:ctrlPr>
                         </m:sSubPr>
@@ -4007,7 +4009,7 @@
         <mc:Fallback>
           <p:sp>
             <p:nvSpPr>
-              <p:cNvPr id="80" name="Rectangle 79"/>
+              <p:cNvPr id="134" name="Rectangle 133"/>
               <p:cNvSpPr>
                 <a:spLocks noRot="1" noChangeAspect="1" noMove="1" noResize="1" noEditPoints="1" noAdjustHandles="1" noChangeArrowheads="1" noChangeShapeType="1" noTextEdit="1"/>
               </p:cNvSpPr>
@@ -4015,16 +4017,16 @@
             </p:nvSpPr>
             <p:spPr>
               <a:xfrm>
-                <a:off x="6625655" y="4646722"/>
+                <a:off x="6627812" y="4228483"/>
                 <a:ext cx="572080" cy="369332"/>
               </a:xfrm>
               <a:prstGeom prst="rect">
                 <a:avLst/>
               </a:prstGeom>
-              <a:blipFill rotWithShape="0">
+              <a:blipFill rotWithShape="1">
                 <a:blip r:embed="rId7"/>
                 <a:stretch>
-                  <a:fillRect b="-9836"/>
+                  <a:fillRect b="-10000"/>
                 </a:stretch>
               </a:blipFill>
             </p:spPr>
@@ -4047,13 +4049,13 @@
         <mc:Choice xmlns:a14="http://schemas.microsoft.com/office/drawing/2010/main" Requires="a14">
           <p:sp>
             <p:nvSpPr>
-              <p:cNvPr id="81" name="Rectangle 80"/>
+              <p:cNvPr id="135" name="Rectangle 134"/>
               <p:cNvSpPr/>
               <p:nvPr/>
             </p:nvSpPr>
             <p:spPr>
               <a:xfrm>
-                <a:off x="11034682" y="4654175"/>
+                <a:off x="11036839" y="4228483"/>
                 <a:ext cx="532518" cy="369332"/>
               </a:xfrm>
               <a:prstGeom prst="rect">
@@ -4066,6 +4068,7 @@
               </a:bodyPr>
               <a:lstStyle/>
               <a:p>
+                <a:pPr/>
                 <a14:m>
                   <m:oMathPara xmlns:m="http://schemas.openxmlformats.org/officeDocument/2006/math">
                     <m:oMathParaPr>
@@ -4076,7 +4079,7 @@
                         <m:sSubPr>
                           <m:ctrlPr>
                             <a:rPr lang="en-US" b="0" i="1" dirty="0" smtClean="0">
-                              <a:latin typeface="Cambria Math" panose="02040503050406030204" pitchFamily="18" charset="0"/>
+                              <a:latin typeface="Cambria Math"/>
                             </a:rPr>
                           </m:ctrlPr>
                         </m:sSubPr>
@@ -4111,7 +4114,7 @@
         <mc:Fallback>
           <p:sp>
             <p:nvSpPr>
-              <p:cNvPr id="81" name="Rectangle 80"/>
+              <p:cNvPr id="135" name="Rectangle 134"/>
               <p:cNvSpPr>
                 <a:spLocks noRot="1" noChangeAspect="1" noMove="1" noResize="1" noEditPoints="1" noAdjustHandles="1" noChangeArrowheads="1" noChangeShapeType="1" noTextEdit="1"/>
               </p:cNvSpPr>
@@ -4119,13 +4122,13 @@
             </p:nvSpPr>
             <p:spPr>
               <a:xfrm>
-                <a:off x="11034682" y="4654175"/>
+                <a:off x="11036839" y="4228483"/>
                 <a:ext cx="532518" cy="369332"/>
               </a:xfrm>
               <a:prstGeom prst="rect">
                 <a:avLst/>
               </a:prstGeom>
-              <a:blipFill rotWithShape="0">
+              <a:blipFill rotWithShape="1">
                 <a:blip r:embed="rId8"/>
                 <a:stretch>
                   <a:fillRect/>
@@ -4151,13 +4154,13 @@
         <mc:Choice xmlns:a14="http://schemas.microsoft.com/office/drawing/2010/main" Requires="a14">
           <p:sp>
             <p:nvSpPr>
-              <p:cNvPr id="82" name="Rectangle 81"/>
+              <p:cNvPr id="136" name="Rectangle 135"/>
               <p:cNvSpPr/>
               <p:nvPr/>
             </p:nvSpPr>
             <p:spPr>
               <a:xfrm>
-                <a:off x="11303164" y="4654175"/>
+                <a:off x="11305321" y="4228483"/>
                 <a:ext cx="589136" cy="369332"/>
               </a:xfrm>
               <a:prstGeom prst="rect">
@@ -4170,6 +4173,7 @@
               </a:bodyPr>
               <a:lstStyle/>
               <a:p>
+                <a:pPr/>
                 <a14:m>
                   <m:oMathPara xmlns:m="http://schemas.openxmlformats.org/officeDocument/2006/math">
                     <m:oMathParaPr>
@@ -4180,7 +4184,7 @@
                         <m:sSubPr>
                           <m:ctrlPr>
                             <a:rPr lang="en-US" b="0" i="1" dirty="0" smtClean="0">
-                              <a:latin typeface="Cambria Math" panose="02040503050406030204" pitchFamily="18" charset="0"/>
+                              <a:latin typeface="Cambria Math"/>
                             </a:rPr>
                           </m:ctrlPr>
                         </m:sSubPr>
@@ -4221,7 +4225,7 @@
         <mc:Fallback>
           <p:sp>
             <p:nvSpPr>
-              <p:cNvPr id="82" name="Rectangle 81"/>
+              <p:cNvPr id="136" name="Rectangle 135"/>
               <p:cNvSpPr>
                 <a:spLocks noRot="1" noChangeAspect="1" noMove="1" noResize="1" noEditPoints="1" noAdjustHandles="1" noChangeArrowheads="1" noChangeShapeType="1" noTextEdit="1"/>
               </p:cNvSpPr>
@@ -4229,13 +4233,13 @@
             </p:nvSpPr>
             <p:spPr>
               <a:xfrm>
-                <a:off x="11303164" y="4654175"/>
+                <a:off x="11305321" y="4228483"/>
                 <a:ext cx="589136" cy="369332"/>
               </a:xfrm>
               <a:prstGeom prst="rect">
                 <a:avLst/>
               </a:prstGeom>
-              <a:blipFill rotWithShape="0">
+              <a:blipFill rotWithShape="1">
                 <a:blip r:embed="rId9"/>
                 <a:stretch>
                   <a:fillRect/>
@@ -4261,13 +4265,13 @@
         <mc:Choice xmlns:a14="http://schemas.microsoft.com/office/drawing/2010/main" Requires="a14">
           <p:sp>
             <p:nvSpPr>
-              <p:cNvPr id="83" name="Rectangle 82"/>
+              <p:cNvPr id="137" name="Rectangle 136"/>
               <p:cNvSpPr/>
               <p:nvPr/>
             </p:nvSpPr>
             <p:spPr>
               <a:xfrm>
-                <a:off x="9499303" y="4653887"/>
+                <a:off x="9501460" y="4228483"/>
                 <a:ext cx="520784" cy="369909"/>
               </a:xfrm>
               <a:prstGeom prst="rect">
@@ -4280,6 +4284,7 @@
               </a:bodyPr>
               <a:lstStyle/>
               <a:p>
+                <a:pPr/>
                 <a14:m>
                   <m:oMathPara xmlns:m="http://schemas.openxmlformats.org/officeDocument/2006/math">
                     <m:oMathParaPr>
@@ -4290,7 +4295,7 @@
                         <m:sSubPr>
                           <m:ctrlPr>
                             <a:rPr lang="en-US" i="1" dirty="0" smtClean="0">
-                              <a:latin typeface="Cambria Math" panose="02040503050406030204" pitchFamily="18" charset="0"/>
+                              <a:latin typeface="Cambria Math"/>
                             </a:rPr>
                           </m:ctrlPr>
                         </m:sSubPr>
@@ -4300,7 +4305,7 @@
                               <m:chr m:val="̅"/>
                               <m:ctrlPr>
                                 <a:rPr lang="en-US" i="1" dirty="0" smtClean="0">
-                                  <a:latin typeface="Cambria Math" panose="02040503050406030204" pitchFamily="18" charset="0"/>
+                                  <a:latin typeface="Cambria Math"/>
                                 </a:rPr>
                               </m:ctrlPr>
                             </m:accPr>
@@ -4337,7 +4342,7 @@
         <mc:Fallback>
           <p:sp>
             <p:nvSpPr>
-              <p:cNvPr id="83" name="Rectangle 82"/>
+              <p:cNvPr id="137" name="Rectangle 136"/>
               <p:cNvSpPr>
                 <a:spLocks noRot="1" noChangeAspect="1" noMove="1" noResize="1" noEditPoints="1" noAdjustHandles="1" noChangeArrowheads="1" noChangeShapeType="1" noTextEdit="1"/>
               </p:cNvSpPr>
@@ -4345,16 +4350,16 @@
             </p:nvSpPr>
             <p:spPr>
               <a:xfrm>
-                <a:off x="9499303" y="4653887"/>
+                <a:off x="9501460" y="4228483"/>
                 <a:ext cx="520784" cy="369909"/>
               </a:xfrm>
               <a:prstGeom prst="rect">
                 <a:avLst/>
               </a:prstGeom>
-              <a:blipFill rotWithShape="0">
+              <a:blipFill rotWithShape="1">
                 <a:blip r:embed="rId10"/>
                 <a:stretch>
-                  <a:fillRect b="-11475"/>
+                  <a:fillRect b="-11667"/>
                 </a:stretch>
               </a:blipFill>
             </p:spPr>
@@ -4641,7 +4646,7 @@
   <a:extraClrSchemeLst/>
   <a:extLst>
     <a:ext uri="{05A4C25C-085E-4340-85A3-A5531E510DB2}">
-      <thm15:themeFamily xmlns:thm15="http://schemas.microsoft.com/office/thememl/2012/main" name="Office Theme" id="{62F939B6-93AF-4DB8-9C6B-D6C7DFDC589F}" vid="{4A3C46E8-61CC-4603-A589-7422A47A8E4A}"/>
+      <thm15:themeFamily xmlns:thm15="http://schemas.microsoft.com/office/thememl/2012/main" xmlns="" name="Office Theme" id="{62F939B6-93AF-4DB8-9C6B-D6C7DFDC589F}" vid="{4A3C46E8-61CC-4603-A589-7422A47A8E4A}"/>
     </a:ext>
   </a:extLst>
 </a:theme>

</xml_diff>